<commit_message>
improve description of the LLM components
</commit_message>
<xml_diff>
--- a/presentation/LORA-RPoenaru.pptx
+++ b/presentation/LORA-RPoenaru.pptx
@@ -17566,50 +17566,7 @@
                   <a:rPr lang="en-US" dirty="0">
                     <a:latin typeface="Helvetica" pitchFamily="2" charset="0"/>
                   </a:rPr>
-                  <a:t>Q, K, and Vs can be regarded as the input units that go into </a:t>
-                </a:r>
-                <a:r>
-                  <a:rPr lang="en-US" dirty="0">
-                    <a:solidFill>
-                      <a:schemeClr val="bg2"/>
-                    </a:solidFill>
-                    <a:latin typeface="Helvetica" pitchFamily="2" charset="0"/>
-                  </a:rPr>
-                  <a:t>SDPA</a:t>
-                </a:r>
-                <a:r>
-                  <a:rPr lang="en-US" dirty="0">
-                    <a:latin typeface="Helvetica" pitchFamily="2" charset="0"/>
-                  </a:rPr>
-                  <a:t>, to capture </a:t>
-                </a:r>
-                <a:r>
-                  <a:rPr lang="en-US" dirty="0">
-                    <a:solidFill>
-                      <a:schemeClr val="bg2"/>
-                    </a:solidFill>
-                    <a:latin typeface="Helvetica" pitchFamily="2" charset="0"/>
-                  </a:rPr>
-                  <a:t>enriched semantic representations </a:t>
-                </a:r>
-                <a:r>
-                  <a:rPr lang="en-US" dirty="0">
-                    <a:latin typeface="Helvetica" pitchFamily="2" charset="0"/>
-                  </a:rPr>
-                  <a:t>(context and position aware)</a:t>
-                </a:r>
-              </a:p>
-              <a:p>
-                <a:pPr lvl="2">
-                  <a:buClr>
-                    <a:srgbClr val="FF7900"/>
-                  </a:buClr>
-                </a:pPr>
-                <a:r>
-                  <a:rPr lang="en-US" dirty="0">
-                    <a:latin typeface="Helvetica" pitchFamily="2" charset="0"/>
-                  </a:rPr>
-                  <a:t>Instead of working with token embeddings directly, they get projected (via </a:t>
+                  <a:t>Instead of working with token embeddings directly they get projected (via </a:t>
                 </a:r>
                 <a:r>
                   <a:rPr lang="en-US" dirty="0">
@@ -17729,6 +17686,49 @@
                   <a:t>, where each head processes SDPA on subspaces for Q, K, and V.</a:t>
                 </a:r>
               </a:p>
+              <a:p>
+                <a:pPr lvl="2">
+                  <a:buClr>
+                    <a:srgbClr val="FF7900"/>
+                  </a:buClr>
+                </a:pPr>
+                <a:r>
+                  <a:rPr lang="en-US" dirty="0">
+                    <a:latin typeface="Helvetica" pitchFamily="2" charset="0"/>
+                  </a:rPr>
+                  <a:t>Results from each head get </a:t>
+                </a:r>
+                <a:r>
+                  <a:rPr lang="en-US" dirty="0">
+                    <a:solidFill>
+                      <a:schemeClr val="bg2"/>
+                    </a:solidFill>
+                    <a:latin typeface="Helvetica" pitchFamily="2" charset="0"/>
+                  </a:rPr>
+                  <a:t>concatenated</a:t>
+                </a:r>
+                <a:r>
+                  <a:rPr lang="en-US" dirty="0">
+                    <a:latin typeface="Helvetica" pitchFamily="2" charset="0"/>
+                  </a:rPr>
+                  <a:t> back into the </a:t>
+                </a:r>
+                <a:r>
+                  <a:rPr lang="en-US" dirty="0">
+                    <a:solidFill>
+                      <a:schemeClr val="bg2"/>
+                    </a:solidFill>
+                    <a:latin typeface="Helvetica" pitchFamily="2" charset="0"/>
+                  </a:rPr>
+                  <a:t>MHA</a:t>
+                </a:r>
+                <a:r>
+                  <a:rPr lang="en-US" dirty="0">
+                    <a:latin typeface="Helvetica" pitchFamily="2" charset="0"/>
+                  </a:rPr>
+                  <a:t> output.</a:t>
+                </a:r>
+              </a:p>
             </p:txBody>
           </p:sp>
         </mc:Choice>
@@ -17876,8 +17876,8 @@
             </p:nvSpPr>
             <p:spPr>
               <a:xfrm>
-                <a:off x="549637" y="2630128"/>
-                <a:ext cx="3267305" cy="505267"/>
+                <a:off x="1091807" y="1796749"/>
+                <a:ext cx="2836096" cy="505267"/>
               </a:xfrm>
               <a:prstGeom prst="rect">
                 <a:avLst/>
@@ -17889,6 +17889,7 @@
               </a:bodyPr>
               <a:lstStyle/>
               <a:p>
+                <a:pPr/>
                 <a14:m>
                   <m:oMathPara xmlns:m="http://schemas.openxmlformats.org/officeDocument/2006/math">
                     <m:oMathParaPr>
@@ -17899,13 +17900,13 @@
                         <m:rPr>
                           <m:sty m:val="p"/>
                         </m:rPr>
-                        <a:rPr lang="en-US" sz="1400" i="1">
+                        <a:rPr lang="en-US" sz="1400" b="0" i="1" smtClean="0">
                           <a:solidFill>
                             <a:schemeClr val="bg2"/>
                           </a:solidFill>
                           <a:latin typeface="Cambria Math" panose="02040503050406030204" pitchFamily="18" charset="0"/>
                         </a:rPr>
-                        <m:t>S</m:t>
+                        <m:t>a</m:t>
                       </m:r>
                       <m:r>
                         <m:rPr>
@@ -17917,28 +17918,7 @@
                           </a:solidFill>
                           <a:latin typeface="Cambria Math" panose="02040503050406030204" pitchFamily="18" charset="0"/>
                         </a:rPr>
-                        <m:t>DP</m:t>
-                      </m:r>
-                      <m:r>
-                        <a:rPr lang="en-US" sz="1400" b="0" i="1" smtClean="0">
-                          <a:solidFill>
-                            <a:schemeClr val="bg2"/>
-                          </a:solidFill>
-                          <a:latin typeface="Cambria Math" panose="02040503050406030204" pitchFamily="18" charset="0"/>
-                        </a:rPr>
-                        <m:t>_</m:t>
-                      </m:r>
-                      <m:r>
-                        <m:rPr>
-                          <m:sty m:val="p"/>
-                        </m:rPr>
-                        <a:rPr lang="en-US" sz="1400" b="0" i="1" smtClean="0">
-                          <a:solidFill>
-                            <a:schemeClr val="bg2"/>
-                          </a:solidFill>
-                          <a:latin typeface="Cambria Math" panose="02040503050406030204" pitchFamily="18" charset="0"/>
-                        </a:rPr>
-                        <m:t>Attn</m:t>
+                        <m:t>ttn</m:t>
                       </m:r>
                       <m:r>
                         <a:rPr lang="en-US" sz="1400" b="0" i="1" smtClean="0">
@@ -18204,8 +18184,8 @@
             </p:nvSpPr>
             <p:spPr>
               <a:xfrm>
-                <a:off x="549637" y="2630128"/>
-                <a:ext cx="3267305" cy="505267"/>
+                <a:off x="1091807" y="1796749"/>
+                <a:ext cx="2836096" cy="505267"/>
               </a:xfrm>
               <a:prstGeom prst="rect">
                 <a:avLst/>
@@ -18213,7 +18193,7 @@
               <a:blipFill>
                 <a:blip r:embed="rId3"/>
                 <a:stretch>
-                  <a:fillRect l="-388" b="-4878"/>
+                  <a:fillRect r="-889" b="-2439"/>
                 </a:stretch>
               </a:blipFill>
             </p:spPr>
@@ -18308,7 +18288,7 @@
         </p:nvCxnSpPr>
         <p:spPr>
           <a:xfrm>
-            <a:off x="4080294" y="2882761"/>
+            <a:off x="4038865" y="2049383"/>
             <a:ext cx="923028" cy="1"/>
           </a:xfrm>
           <a:prstGeom prst="straightConnector1">
@@ -24308,7 +24288,52 @@
                   <a:rPr lang="en-US" dirty="0">
                     <a:latin typeface="Helvetica" pitchFamily="2" charset="0"/>
                   </a:rPr>
-                  <a:t>Encoder block. Generates </a:t>
+                  <a:t>Encoder block. Generate a context-rich representation of the input, which is then used as the </a:t>
+                </a:r>
+                <a:r>
+                  <a:rPr lang="en-US" dirty="0">
+                    <a:solidFill>
+                      <a:schemeClr val="bg2"/>
+                    </a:solidFill>
+                    <a:latin typeface="Helvetica" pitchFamily="2" charset="0"/>
+                  </a:rPr>
+                  <a:t>Keys (K) </a:t>
+                </a:r>
+                <a:r>
+                  <a:rPr lang="en-US" dirty="0">
+                    <a:latin typeface="Helvetica" pitchFamily="2" charset="0"/>
+                  </a:rPr>
+                  <a:t>and </a:t>
+                </a:r>
+                <a:r>
+                  <a:rPr lang="en-US" dirty="0">
+                    <a:solidFill>
+                      <a:schemeClr val="bg2"/>
+                    </a:solidFill>
+                    <a:latin typeface="Helvetica" pitchFamily="2" charset="0"/>
+                  </a:rPr>
+                  <a:t>Values (V) </a:t>
+                </a:r>
+                <a:r>
+                  <a:rPr lang="en-US" dirty="0">
+                    <a:latin typeface="Helvetica" pitchFamily="2" charset="0"/>
+                  </a:rPr>
+                  <a:t>for the decoder. N such blocks</a:t>
+                </a:r>
+              </a:p>
+              <a:p>
+                <a:pPr marL="342900" lvl="2" indent="-342900">
+                  <a:buClr>
+                    <a:srgbClr val="FF7900"/>
+                  </a:buClr>
+                  <a:buFont typeface="+mj-lt"/>
+                  <a:buAutoNum type="arabicPeriod"/>
+                </a:pPr>
+                <a:r>
+                  <a:rPr lang="en-US" dirty="0">
+                    <a:latin typeface="Helvetica" pitchFamily="2" charset="0"/>
+                  </a:rPr>
+                  <a:t>Decoder block. Takes targets and encoder output and generates context-rich representations via 2xMHA with target </a:t>
                 </a:r>
                 <a:r>
                   <a:rPr lang="en-US" dirty="0">
@@ -24323,92 +24348,7 @@
                   <a:rPr lang="en-US" dirty="0">
                     <a:latin typeface="Helvetica" pitchFamily="2" charset="0"/>
                   </a:rPr>
-                  <a:t>, </a:t>
-                </a:r>
-                <a:r>
-                  <a:rPr lang="en-US" dirty="0">
-                    <a:solidFill>
-                      <a:schemeClr val="bg2"/>
-                    </a:solidFill>
-                    <a:latin typeface="Helvetica" pitchFamily="2" charset="0"/>
-                  </a:rPr>
-                  <a:t>Keys (K)</a:t>
-                </a:r>
-                <a:r>
-                  <a:rPr lang="en-US" dirty="0">
-                    <a:latin typeface="Helvetica" pitchFamily="2" charset="0"/>
-                  </a:rPr>
-                  <a:t> and </a:t>
-                </a:r>
-                <a:r>
-                  <a:rPr lang="en-US" dirty="0">
-                    <a:solidFill>
-                      <a:schemeClr val="bg2"/>
-                    </a:solidFill>
-                    <a:latin typeface="Helvetica" pitchFamily="2" charset="0"/>
-                  </a:rPr>
-                  <a:t>Values (V) </a:t>
-                </a:r>
-                <a:r>
-                  <a:rPr lang="en-US" dirty="0">
-                    <a:latin typeface="Helvetica" pitchFamily="2" charset="0"/>
-                  </a:rPr>
-                  <a:t>via 1x</a:t>
-                </a:r>
-                <a:r>
-                  <a:rPr lang="en-US" dirty="0">
-                    <a:solidFill>
-                      <a:schemeClr val="bg2"/>
-                    </a:solidFill>
-                    <a:latin typeface="Helvetica" pitchFamily="2" charset="0"/>
-                  </a:rPr>
-                  <a:t>MHA</a:t>
-                </a:r>
-                <a:r>
-                  <a:rPr lang="en-US" dirty="0">
-                    <a:latin typeface="Helvetica" pitchFamily="2" charset="0"/>
-                  </a:rPr>
-                  <a:t>), to be used as input in the decoder. </a:t>
-                </a:r>
-                <a14:m>
-                  <m:oMath xmlns:m="http://schemas.openxmlformats.org/officeDocument/2006/math">
-                    <m:r>
-                      <m:rPr>
-                        <m:sty m:val="p"/>
-                      </m:rPr>
-                      <a:rPr lang="en-US" b="0" i="0" smtClean="0">
-                        <a:latin typeface="Cambria Math" panose="02040503050406030204" pitchFamily="18" charset="0"/>
-                      </a:rPr>
-                      <m:t>N</m:t>
-                    </m:r>
-                  </m:oMath>
-                </a14:m>
-                <a:r>
-                  <a:rPr lang="en-US" dirty="0">
-                    <a:latin typeface="Helvetica" pitchFamily="2" charset="0"/>
-                  </a:rPr>
-                  <a:t> such blocks</a:t>
-                </a:r>
-                <a:endParaRPr lang="en-US" dirty="0">
-                  <a:solidFill>
-                    <a:schemeClr val="bg2"/>
-                  </a:solidFill>
-                  <a:latin typeface="Helvetica" pitchFamily="2" charset="0"/>
-                </a:endParaRPr>
-              </a:p>
-              <a:p>
-                <a:pPr marL="342900" lvl="2" indent="-342900">
-                  <a:buClr>
-                    <a:srgbClr val="FF7900"/>
-                  </a:buClr>
-                  <a:buFont typeface="+mj-lt"/>
-                  <a:buAutoNum type="arabicPeriod"/>
-                </a:pPr>
-                <a:r>
-                  <a:rPr lang="en-US" dirty="0">
-                    <a:latin typeface="Helvetica" pitchFamily="2" charset="0"/>
-                  </a:rPr>
-                  <a:t>Decoder block. Takes encoder output + targets and generates context-rich representations, generating probabilities (token by token). </a:t>
+                  <a:t> and the encoder K,V. </a:t>
                 </a:r>
                 <a14:m>
                   <m:oMath xmlns:m="http://schemas.openxmlformats.org/officeDocument/2006/math">
@@ -24463,7 +24403,7 @@
                   <a:rPr lang="en-US" dirty="0">
                     <a:latin typeface="Helvetica" pitchFamily="2" charset="0"/>
                   </a:rPr>
-                  <a:t>(SDPA) to Q,K,V such that every token captures semantic information </a:t>
+                  <a:t>(SDPA) to QKV such that every token captures semantic information </a:t>
                 </a:r>
                 <a:r>
                   <a:rPr lang="en-US" dirty="0" err="1">
@@ -24475,7 +24415,7 @@
                   <a:rPr lang="en-US" dirty="0">
                     <a:latin typeface="Helvetica" pitchFamily="2" charset="0"/>
                   </a:rPr>
-                  <a:t>  all other tokens.</a:t>
+                  <a:t>  all other tokens</a:t>
                 </a:r>
               </a:p>
               <a:p>
@@ -24566,7 +24506,7 @@
               <a:blipFill>
                 <a:blip r:embed="rId2"/>
                 <a:stretch>
-                  <a:fillRect l="-1852" t="-3057"/>
+                  <a:fillRect l="-1852" t="-3057" r="-529"/>
                 </a:stretch>
               </a:blipFill>
             </p:spPr>
@@ -24933,6 +24873,118 @@
             <a:r>
               <a:rPr lang="en-US" sz="1000" dirty="0"/>
               <a:t>] </a:t>
+            </a:r>
+          </a:p>
+        </p:txBody>
+      </p:sp>
+      <p:sp>
+        <p:nvSpPr>
+          <p:cNvPr id="4" name="TextBox 3">
+            <a:extLst>
+              <a:ext uri="{FF2B5EF4-FFF2-40B4-BE49-F238E27FC236}">
+                <a16:creationId xmlns:a16="http://schemas.microsoft.com/office/drawing/2014/main" id="{07CE4825-F60F-2FEE-C589-1959B730E907}"/>
+              </a:ext>
+            </a:extLst>
+          </p:cNvPr>
+          <p:cNvSpPr txBox="1"/>
+          <p:nvPr/>
+        </p:nvSpPr>
+        <p:spPr>
+          <a:xfrm>
+            <a:off x="7223064" y="2833783"/>
+            <a:ext cx="169918" cy="215444"/>
+          </a:xfrm>
+          <a:prstGeom prst="rect">
+            <a:avLst/>
+          </a:prstGeom>
+        </p:spPr>
+        <p:txBody>
+          <a:bodyPr wrap="none" lIns="0" tIns="0" rIns="0" bIns="0" rtlCol="0">
+            <a:spAutoFit/>
+          </a:bodyPr>
+          <a:lstStyle/>
+          <a:p>
+            <a:r>
+              <a:rPr lang="en-US" sz="1400" dirty="0">
+                <a:solidFill>
+                  <a:schemeClr val="bg2"/>
+                </a:solidFill>
+              </a:rPr>
+              <a:t>3*</a:t>
+            </a:r>
+            <a:endParaRPr lang="en-US" sz="1400" dirty="0"/>
+          </a:p>
+        </p:txBody>
+      </p:sp>
+      <p:sp>
+        <p:nvSpPr>
+          <p:cNvPr id="7" name="TextBox 6">
+            <a:extLst>
+              <a:ext uri="{FF2B5EF4-FFF2-40B4-BE49-F238E27FC236}">
+                <a16:creationId xmlns:a16="http://schemas.microsoft.com/office/drawing/2014/main" id="{4E2101AE-BD71-FEA1-1D03-35DE17A079C8}"/>
+              </a:ext>
+            </a:extLst>
+          </p:cNvPr>
+          <p:cNvSpPr txBox="1"/>
+          <p:nvPr/>
+        </p:nvSpPr>
+        <p:spPr>
+          <a:xfrm>
+            <a:off x="7223064" y="2166637"/>
+            <a:ext cx="99386" cy="215444"/>
+          </a:xfrm>
+          <a:prstGeom prst="rect">
+            <a:avLst/>
+          </a:prstGeom>
+        </p:spPr>
+        <p:txBody>
+          <a:bodyPr wrap="none" lIns="0" tIns="0" rIns="0" bIns="0" rtlCol="0">
+            <a:spAutoFit/>
+          </a:bodyPr>
+          <a:lstStyle/>
+          <a:p>
+            <a:r>
+              <a:rPr lang="en-US" sz="1400" dirty="0">
+                <a:solidFill>
+                  <a:schemeClr val="bg2"/>
+                </a:solidFill>
+              </a:rPr>
+              <a:t>3</a:t>
+            </a:r>
+            <a:endParaRPr lang="en-US" sz="1400" dirty="0"/>
+          </a:p>
+        </p:txBody>
+      </p:sp>
+      <p:sp>
+        <p:nvSpPr>
+          <p:cNvPr id="9" name="TextBox 8">
+            <a:extLst>
+              <a:ext uri="{FF2B5EF4-FFF2-40B4-BE49-F238E27FC236}">
+                <a16:creationId xmlns:a16="http://schemas.microsoft.com/office/drawing/2014/main" id="{2B6F0C4A-9021-44CB-A900-AEA70FDEB681}"/>
+              </a:ext>
+            </a:extLst>
+          </p:cNvPr>
+          <p:cNvSpPr txBox="1"/>
+          <p:nvPr/>
+        </p:nvSpPr>
+        <p:spPr>
+          <a:xfrm>
+            <a:off x="310142" y="4722118"/>
+            <a:ext cx="4092467" cy="153888"/>
+          </a:xfrm>
+          <a:prstGeom prst="rect">
+            <a:avLst/>
+          </a:prstGeom>
+        </p:spPr>
+        <p:txBody>
+          <a:bodyPr wrap="none" lIns="0" tIns="0" rIns="0" bIns="0" rtlCol="0">
+            <a:spAutoFit/>
+          </a:bodyPr>
+          <a:lstStyle/>
+          <a:p>
+            <a:r>
+              <a:rPr lang="en-US" sz="1000" dirty="0"/>
+              <a:t>* Masked MHA allows current token to attend only to previous ones</a:t>
             </a:r>
           </a:p>
         </p:txBody>
@@ -25167,8 +25219,8 @@
             </p:nvSpPr>
             <p:spPr>
               <a:xfrm>
-                <a:off x="314326" y="1184275"/>
-                <a:ext cx="3826354" cy="2891706"/>
+                <a:off x="314325" y="1184275"/>
+                <a:ext cx="8376787" cy="2891706"/>
               </a:xfrm>
             </p:spPr>
             <p:txBody>
@@ -25289,7 +25341,7 @@
                   <a:rPr lang="en-US" dirty="0">
                     <a:latin typeface="Helvetica" pitchFamily="2" charset="0"/>
                   </a:rPr>
-                  <a:t>) will be used to generate Queries, Keys, Values</a:t>
+                  <a:t>) will be used to generate Queries, Keys, Values (QKV)</a:t>
                 </a:r>
               </a:p>
               <a:p>
@@ -25302,7 +25354,7 @@
                   <a:rPr lang="en-US" dirty="0">
                     <a:latin typeface="Helvetica" pitchFamily="2" charset="0"/>
                   </a:rPr>
-                  <a:t>Q, K, and Vs can be regarded as the </a:t>
+                  <a:t>QKV can be regarded as the </a:t>
                 </a:r>
                 <a:r>
                   <a:rPr lang="en-US" dirty="0">
@@ -25326,13 +25378,13 @@
                     </a:solidFill>
                     <a:latin typeface="Helvetica" pitchFamily="2" charset="0"/>
                   </a:rPr>
-                  <a:t>SDPA</a:t>
+                  <a:t>SDPA </a:t>
                 </a:r>
                 <a:r>
                   <a:rPr lang="en-US" dirty="0">
                     <a:latin typeface="Helvetica" pitchFamily="2" charset="0"/>
                   </a:rPr>
-                  <a:t>, to capture </a:t>
+                  <a:t>for capturing </a:t>
                 </a:r>
                 <a:r>
                   <a:rPr lang="en-US" dirty="0">
@@ -25372,13 +25424,13 @@
             </p:nvSpPr>
             <p:spPr>
               <a:xfrm>
-                <a:off x="314326" y="1184275"/>
-                <a:ext cx="3826354" cy="2891706"/>
+                <a:off x="314325" y="1184275"/>
+                <a:ext cx="8376787" cy="2891706"/>
               </a:xfrm>
               <a:blipFill>
                 <a:blip r:embed="rId2"/>
                 <a:stretch>
-                  <a:fillRect l="-2649" t="-3057" r="-3311"/>
+                  <a:fillRect l="-1210" t="-2620" r="-303"/>
                 </a:stretch>
               </a:blipFill>
             </p:spPr>
@@ -25503,8 +25555,8 @@
         </p:blipFill>
         <p:spPr>
           <a:xfrm>
-            <a:off x="4246582" y="1184275"/>
-            <a:ext cx="4826913" cy="2564889"/>
+            <a:off x="1923691" y="1923786"/>
+            <a:ext cx="5650841" cy="3002702"/>
           </a:xfrm>
           <a:prstGeom prst="rect">
             <a:avLst/>
@@ -26422,6 +26474,17 @@
 </file>
 
 <file path=customXml/item1.xml><?xml version="1.0" encoding="utf-8"?>
+<p:properties xmlns:p="http://schemas.microsoft.com/office/2006/metadata/properties" xmlns:xsi="http://www.w3.org/2001/XMLSchema-instance" xmlns:pc="http://schemas.microsoft.com/office/infopath/2007/PartnerControls">
+  <documentManagement>
+    <TaxCatchAll xmlns="eff491a8-9e89-43ed-bdac-cae08270df65" xsi:nil="true"/>
+    <lcf76f155ced4ddcb4097134ff3c332f xmlns="171f1213-7bf6-4d86-990a-6b8ce816bd43">
+      <Terms xmlns="http://schemas.microsoft.com/office/infopath/2007/PartnerControls"/>
+    </lcf76f155ced4ddcb4097134ff3c332f>
+  </documentManagement>
+</p:properties>
+</file>
+
+<file path=customXml/item2.xml><?xml version="1.0" encoding="utf-8"?>
 <ct:contentTypeSchema xmlns:ct="http://schemas.microsoft.com/office/2006/metadata/contentType" xmlns:ma="http://schemas.microsoft.com/office/2006/metadata/properties/metaAttributes" ct:_="" ma:_="" ma:contentTypeName="Document" ma:contentTypeID="0x0101001CA32C140A078341B5F80E20CC80637A" ma:contentTypeVersion="16" ma:contentTypeDescription="Crée un document." ma:contentTypeScope="" ma:versionID="546d018dda1d24d933136aa4939ad88f">
   <xsd:schema xmlns:xsd="http://www.w3.org/2001/XMLSchema" xmlns:xs="http://www.w3.org/2001/XMLSchema" xmlns:p="http://schemas.microsoft.com/office/2006/metadata/properties" xmlns:ns2="171f1213-7bf6-4d86-990a-6b8ce816bd43" xmlns:ns3="eff491a8-9e89-43ed-bdac-cae08270df65" targetNamespace="http://schemas.microsoft.com/office/2006/metadata/properties" ma:root="true" ma:fieldsID="6e1ae2b7d1eaf98eb406aedefb875955" ns2:_="" ns3:_="">
     <xsd:import namespace="171f1213-7bf6-4d86-990a-6b8ce816bd43"/>
@@ -26662,17 +26725,6 @@
 </ct:contentTypeSchema>
 </file>
 
-<file path=customXml/item2.xml><?xml version="1.0" encoding="utf-8"?>
-<p:properties xmlns:p="http://schemas.microsoft.com/office/2006/metadata/properties" xmlns:xsi="http://www.w3.org/2001/XMLSchema-instance" xmlns:pc="http://schemas.microsoft.com/office/infopath/2007/PartnerControls">
-  <documentManagement>
-    <TaxCatchAll xmlns="eff491a8-9e89-43ed-bdac-cae08270df65" xsi:nil="true"/>
-    <lcf76f155ced4ddcb4097134ff3c332f xmlns="171f1213-7bf6-4d86-990a-6b8ce816bd43">
-      <Terms xmlns="http://schemas.microsoft.com/office/infopath/2007/PartnerControls"/>
-    </lcf76f155ced4ddcb4097134ff3c332f>
-  </documentManagement>
-</p:properties>
-</file>
-
 <file path=customXml/item3.xml><?xml version="1.0" encoding="utf-8"?>
 <?mso-contentType ?>
 <FormTemplates xmlns="http://schemas.microsoft.com/sharepoint/v3/contenttype/forms">
@@ -26683,6 +26735,24 @@
 </file>
 
 <file path=customXml/itemProps1.xml><?xml version="1.0" encoding="utf-8"?>
+<ds:datastoreItem xmlns:ds="http://schemas.openxmlformats.org/officeDocument/2006/customXml" ds:itemID="{54B223DC-0EA2-4B5D-8283-CB961A092825}">
+  <ds:schemaRefs>
+    <ds:schemaRef ds:uri="http://schemas.microsoft.com/office/2006/documentManagement/types"/>
+    <ds:schemaRef ds:uri="http://purl.org/dc/elements/1.1/"/>
+    <ds:schemaRef ds:uri="http://schemas.microsoft.com/office/2006/metadata/properties"/>
+    <ds:schemaRef ds:uri="http://schemas.microsoft.com/sharepoint/v3"/>
+    <ds:schemaRef ds:uri="http://purl.org/dc/terms/"/>
+    <ds:schemaRef ds:uri="http://schemas.openxmlformats.org/package/2006/metadata/core-properties"/>
+    <ds:schemaRef ds:uri="http://purl.org/dc/dcmitype/"/>
+    <ds:schemaRef ds:uri="http://schemas.microsoft.com/office/infopath/2007/PartnerControls"/>
+    <ds:schemaRef ds:uri="http://www.w3.org/XML/1998/namespace"/>
+    <ds:schemaRef ds:uri="eff491a8-9e89-43ed-bdac-cae08270df65"/>
+    <ds:schemaRef ds:uri="171f1213-7bf6-4d86-990a-6b8ce816bd43"/>
+  </ds:schemaRefs>
+</ds:datastoreItem>
+</file>
+
+<file path=customXml/itemProps2.xml><?xml version="1.0" encoding="utf-8"?>
 <ds:datastoreItem xmlns:ds="http://schemas.openxmlformats.org/officeDocument/2006/customXml" ds:itemID="{702E500B-C12C-4E9E-A03B-EBA9A45F5EED}">
   <ds:schemaRefs>
     <ds:schemaRef ds:uri="http://schemas.microsoft.com/office/2006/metadata/contentType"/>
@@ -26701,24 +26771,6 @@
 </ds:datastoreItem>
 </file>
 
-<file path=customXml/itemProps2.xml><?xml version="1.0" encoding="utf-8"?>
-<ds:datastoreItem xmlns:ds="http://schemas.openxmlformats.org/officeDocument/2006/customXml" ds:itemID="{54B223DC-0EA2-4B5D-8283-CB961A092825}">
-  <ds:schemaRefs>
-    <ds:schemaRef ds:uri="http://schemas.microsoft.com/office/2006/documentManagement/types"/>
-    <ds:schemaRef ds:uri="http://purl.org/dc/elements/1.1/"/>
-    <ds:schemaRef ds:uri="http://schemas.microsoft.com/office/2006/metadata/properties"/>
-    <ds:schemaRef ds:uri="http://schemas.microsoft.com/sharepoint/v3"/>
-    <ds:schemaRef ds:uri="http://purl.org/dc/terms/"/>
-    <ds:schemaRef ds:uri="http://schemas.openxmlformats.org/package/2006/metadata/core-properties"/>
-    <ds:schemaRef ds:uri="http://purl.org/dc/dcmitype/"/>
-    <ds:schemaRef ds:uri="http://schemas.microsoft.com/office/infopath/2007/PartnerControls"/>
-    <ds:schemaRef ds:uri="http://www.w3.org/XML/1998/namespace"/>
-    <ds:schemaRef ds:uri="eff491a8-9e89-43ed-bdac-cae08270df65"/>
-    <ds:schemaRef ds:uri="171f1213-7bf6-4d86-990a-6b8ce816bd43"/>
-  </ds:schemaRefs>
-</ds:datastoreItem>
-</file>
-
 <file path=customXml/itemProps3.xml><?xml version="1.0" encoding="utf-8"?>
 <ds:datastoreItem xmlns:ds="http://schemas.openxmlformats.org/officeDocument/2006/customXml" ds:itemID="{7BC9E46E-2939-4C92-A847-189854327AFD}">
   <ds:schemaRefs>

</xml_diff>